<commit_message>
quotes and figures, finalized
</commit_message>
<xml_diff>
--- a/Курсов_проект_CRM_Systems_81271/CRM_системи_81271.pptx
+++ b/Курсов_проект_CRM_Systems_81271/CRM_системи_81271.pptx
@@ -316,7 +316,8 @@
           <a:p>
             <a:fld id="{64849C1B-5A3A-41AC-84C9-BE833892323F}" type="datetimeFigureOut">
               <a:rPr lang="en-US" smtClean="0"/>
-              <a:t>11/26/2020</a:t>
+              <a:pPr/>
+              <a:t>11/27/2020</a:t>
             </a:fld>
             <a:endParaRPr lang="en-US"/>
           </a:p>
@@ -368,6 +369,7 @@
           <a:p>
             <a:fld id="{56D249E5-C4CE-4EDB-B813-96FF47A30206}" type="slidenum">
               <a:rPr lang="en-US" smtClean="0"/>
+              <a:pPr/>
               <a:t>‹#›</a:t>
             </a:fld>
             <a:endParaRPr lang="en-US"/>
@@ -669,7 +671,8 @@
           <a:p>
             <a:fld id="{64849C1B-5A3A-41AC-84C9-BE833892323F}" type="datetimeFigureOut">
               <a:rPr lang="en-US" smtClean="0"/>
-              <a:t>11/26/2020</a:t>
+              <a:pPr/>
+              <a:t>11/27/2020</a:t>
             </a:fld>
             <a:endParaRPr lang="en-US"/>
           </a:p>
@@ -711,6 +714,7 @@
           <a:p>
             <a:fld id="{56D249E5-C4CE-4EDB-B813-96FF47A30206}" type="slidenum">
               <a:rPr lang="en-US" smtClean="0"/>
+              <a:pPr/>
               <a:t>‹#›</a:t>
             </a:fld>
             <a:endParaRPr lang="en-US"/>
@@ -844,7 +848,8 @@
           <a:p>
             <a:fld id="{64849C1B-5A3A-41AC-84C9-BE833892323F}" type="datetimeFigureOut">
               <a:rPr lang="en-US" smtClean="0"/>
-              <a:t>11/26/2020</a:t>
+              <a:pPr/>
+              <a:t>11/27/2020</a:t>
             </a:fld>
             <a:endParaRPr lang="en-US"/>
           </a:p>
@@ -886,6 +891,7 @@
           <a:p>
             <a:fld id="{56D249E5-C4CE-4EDB-B813-96FF47A30206}" type="slidenum">
               <a:rPr lang="en-US" smtClean="0"/>
+              <a:pPr/>
               <a:t>‹#›</a:t>
             </a:fld>
             <a:endParaRPr lang="en-US"/>
@@ -957,7 +963,8 @@
           <a:p>
             <a:fld id="{64849C1B-5A3A-41AC-84C9-BE833892323F}" type="datetimeFigureOut">
               <a:rPr lang="en-US" smtClean="0"/>
-              <a:t>11/26/2020</a:t>
+              <a:pPr/>
+              <a:t>11/27/2020</a:t>
             </a:fld>
             <a:endParaRPr lang="en-US"/>
           </a:p>
@@ -999,6 +1006,7 @@
           <a:p>
             <a:fld id="{56D249E5-C4CE-4EDB-B813-96FF47A30206}" type="slidenum">
               <a:rPr lang="en-US" smtClean="0"/>
+              <a:pPr/>
               <a:t>‹#›</a:t>
             </a:fld>
             <a:endParaRPr lang="en-US"/>
@@ -1315,7 +1323,8 @@
           <a:p>
             <a:fld id="{64849C1B-5A3A-41AC-84C9-BE833892323F}" type="datetimeFigureOut">
               <a:rPr lang="en-US" smtClean="0"/>
-              <a:t>11/26/2020</a:t>
+              <a:pPr/>
+              <a:t>11/27/2020</a:t>
             </a:fld>
             <a:endParaRPr lang="en-US"/>
           </a:p>
@@ -1509,6 +1518,7 @@
           <a:p>
             <a:fld id="{56D249E5-C4CE-4EDB-B813-96FF47A30206}" type="slidenum">
               <a:rPr lang="en-US" smtClean="0"/>
+              <a:pPr/>
               <a:t>‹#›</a:t>
             </a:fld>
             <a:endParaRPr lang="en-US"/>
@@ -1580,7 +1590,8 @@
           <a:p>
             <a:fld id="{64849C1B-5A3A-41AC-84C9-BE833892323F}" type="datetimeFigureOut">
               <a:rPr lang="en-US" smtClean="0"/>
-              <a:t>11/26/2020</a:t>
+              <a:pPr/>
+              <a:t>11/27/2020</a:t>
             </a:fld>
             <a:endParaRPr lang="en-US"/>
           </a:p>
@@ -1622,6 +1633,7 @@
           <a:p>
             <a:fld id="{56D249E5-C4CE-4EDB-B813-96FF47A30206}" type="slidenum">
               <a:rPr lang="en-US" smtClean="0"/>
+              <a:pPr/>
               <a:t>‹#›</a:t>
             </a:fld>
             <a:endParaRPr lang="en-US"/>
@@ -1942,7 +1954,8 @@
           <a:p>
             <a:fld id="{64849C1B-5A3A-41AC-84C9-BE833892323F}" type="datetimeFigureOut">
               <a:rPr lang="en-US" smtClean="0"/>
-              <a:t>11/26/2020</a:t>
+              <a:pPr/>
+              <a:t>11/27/2020</a:t>
             </a:fld>
             <a:endParaRPr lang="en-US"/>
           </a:p>
@@ -1984,6 +1997,7 @@
           <a:p>
             <a:fld id="{56D249E5-C4CE-4EDB-B813-96FF47A30206}" type="slidenum">
               <a:rPr lang="en-US" smtClean="0"/>
+              <a:pPr/>
               <a:t>‹#›</a:t>
             </a:fld>
             <a:endParaRPr lang="en-US"/>
@@ -2169,7 +2183,8 @@
           <a:p>
             <a:fld id="{64849C1B-5A3A-41AC-84C9-BE833892323F}" type="datetimeFigureOut">
               <a:rPr lang="en-US" smtClean="0"/>
-              <a:t>11/26/2020</a:t>
+              <a:pPr/>
+              <a:t>11/27/2020</a:t>
             </a:fld>
             <a:endParaRPr lang="en-US"/>
           </a:p>
@@ -2211,6 +2226,7 @@
           <a:p>
             <a:fld id="{56D249E5-C4CE-4EDB-B813-96FF47A30206}" type="slidenum">
               <a:rPr lang="en-US" smtClean="0"/>
+              <a:pPr/>
               <a:t>‹#›</a:t>
             </a:fld>
             <a:endParaRPr lang="en-US"/>
@@ -2259,7 +2275,8 @@
           <a:p>
             <a:fld id="{64849C1B-5A3A-41AC-84C9-BE833892323F}" type="datetimeFigureOut">
               <a:rPr lang="en-US" smtClean="0"/>
-              <a:t>11/26/2020</a:t>
+              <a:pPr/>
+              <a:t>11/27/2020</a:t>
             </a:fld>
             <a:endParaRPr lang="en-US"/>
           </a:p>
@@ -2301,6 +2318,7 @@
           <a:p>
             <a:fld id="{56D249E5-C4CE-4EDB-B813-96FF47A30206}" type="slidenum">
               <a:rPr lang="en-US" smtClean="0"/>
+              <a:pPr/>
               <a:t>‹#›</a:t>
             </a:fld>
             <a:endParaRPr lang="en-US"/>
@@ -2526,7 +2544,8 @@
           <a:p>
             <a:fld id="{64849C1B-5A3A-41AC-84C9-BE833892323F}" type="datetimeFigureOut">
               <a:rPr lang="en-US" smtClean="0"/>
-              <a:t>11/26/2020</a:t>
+              <a:pPr/>
+              <a:t>11/27/2020</a:t>
             </a:fld>
             <a:endParaRPr lang="en-US"/>
           </a:p>
@@ -2568,6 +2587,7 @@
           <a:p>
             <a:fld id="{56D249E5-C4CE-4EDB-B813-96FF47A30206}" type="slidenum">
               <a:rPr lang="en-US" smtClean="0"/>
+              <a:pPr/>
               <a:t>‹#›</a:t>
             </a:fld>
             <a:endParaRPr lang="en-US"/>
@@ -2754,7 +2774,8 @@
           <a:p>
             <a:fld id="{64849C1B-5A3A-41AC-84C9-BE833892323F}" type="datetimeFigureOut">
               <a:rPr lang="en-US" smtClean="0"/>
-              <a:t>11/26/2020</a:t>
+              <a:pPr/>
+              <a:t>11/27/2020</a:t>
             </a:fld>
             <a:endParaRPr lang="en-US"/>
           </a:p>
@@ -2806,6 +2827,7 @@
           <a:p>
             <a:fld id="{56D249E5-C4CE-4EDB-B813-96FF47A30206}" type="slidenum">
               <a:rPr lang="en-US" smtClean="0"/>
+              <a:pPr/>
               <a:t>‹#›</a:t>
             </a:fld>
             <a:endParaRPr lang="en-US"/>
@@ -3253,7 +3275,8 @@
           <a:p>
             <a:fld id="{64849C1B-5A3A-41AC-84C9-BE833892323F}" type="datetimeFigureOut">
               <a:rPr lang="en-US" smtClean="0"/>
-              <a:t>11/26/2020</a:t>
+              <a:pPr/>
+              <a:t>11/27/2020</a:t>
             </a:fld>
             <a:endParaRPr lang="en-US"/>
           </a:p>
@@ -3335,6 +3358,7 @@
           <a:p>
             <a:fld id="{56D249E5-C4CE-4EDB-B813-96FF47A30206}" type="slidenum">
               <a:rPr lang="en-US" smtClean="0"/>
+              <a:pPr/>
               <a:t>‹#›</a:t>
             </a:fld>
             <a:endParaRPr lang="en-US"/>
@@ -3877,13 +3901,7 @@
               <a:rPr lang="en-US" b="1" dirty="0" smtClean="0">
                 <a:latin typeface="Buxton Sketch" pitchFamily="66" charset="0"/>
               </a:rPr>
-              <a:t> </a:t>
-            </a:r>
-            <a:r>
-              <a:rPr lang="en-US" b="1" dirty="0" smtClean="0">
-                <a:latin typeface="Buxton Sketch" pitchFamily="66" charset="0"/>
-              </a:rPr>
-              <a:t>и</a:t>
+              <a:t> и</a:t>
             </a:r>
             <a:r>
               <a:rPr lang="bg-BG" b="1" dirty="0" smtClean="0">
@@ -4115,13 +4133,7 @@
               <a:rPr lang="en-US" sz="1200" dirty="0" smtClean="0">
                 <a:latin typeface="Buxton Sketch" pitchFamily="66" charset="0"/>
               </a:rPr>
-              <a:t> </a:t>
-            </a:r>
-            <a:r>
-              <a:rPr lang="en-US" sz="1200" dirty="0" smtClean="0">
-                <a:latin typeface="Buxton Sketch" pitchFamily="66" charset="0"/>
-              </a:rPr>
-              <a:t>и </a:t>
+              <a:t> и </a:t>
             </a:r>
             <a:r>
               <a:rPr lang="en-US" sz="1200" dirty="0" err="1" smtClean="0">
@@ -5222,10 +5234,10 @@
               <a:t>влияние</a:t>
             </a:r>
             <a:r>
-              <a:rPr lang="en-US" sz="1200" dirty="0" smtClean="0">
-                <a:latin typeface="Buxton Sketch" pitchFamily="66" charset="0"/>
-              </a:rPr>
-              <a:t>  </a:t>
+              <a:rPr lang="bg-BG" sz="1200" dirty="0" smtClean="0">
+                <a:latin typeface="Buxton Sketch" pitchFamily="66" charset="0"/>
+              </a:rPr>
+              <a:t> </a:t>
             </a:r>
             <a:r>
               <a:rPr lang="en-US" sz="1200" dirty="0" err="1" smtClean="0">
@@ -5349,31 +5361,37 @@
               <a:rPr lang="en-US" sz="1200" dirty="0" smtClean="0">
                 <a:latin typeface="Buxton Sketch" pitchFamily="66" charset="0"/>
               </a:rPr>
-              <a:t> </a:t>
+              <a:t> и </a:t>
+            </a:r>
+            <a:r>
+              <a:rPr lang="en-US" sz="1200" dirty="0" err="1" smtClean="0">
+                <a:latin typeface="Buxton Sketch" pitchFamily="66" charset="0"/>
+              </a:rPr>
+              <a:t>слабости</a:t>
             </a:r>
             <a:r>
               <a:rPr lang="en-US" sz="1200" dirty="0" smtClean="0">
                 <a:latin typeface="Buxton Sketch" pitchFamily="66" charset="0"/>
               </a:rPr>
-              <a:t>и </a:t>
+              <a:t> в </a:t>
             </a:r>
             <a:r>
               <a:rPr lang="en-US" sz="1200" dirty="0" err="1" smtClean="0">
                 <a:latin typeface="Buxton Sketch" pitchFamily="66" charset="0"/>
               </a:rPr>
-              <a:t>слабости</a:t>
+              <a:t>тази</a:t>
             </a:r>
             <a:r>
               <a:rPr lang="en-US" sz="1200" dirty="0" smtClean="0">
                 <a:latin typeface="Buxton Sketch" pitchFamily="66" charset="0"/>
               </a:rPr>
-              <a:t> в </a:t>
+              <a:t> </a:t>
             </a:r>
             <a:r>
               <a:rPr lang="en-US" sz="1200" dirty="0" err="1" smtClean="0">
                 <a:latin typeface="Buxton Sketch" pitchFamily="66" charset="0"/>
               </a:rPr>
-              <a:t>тази</a:t>
+              <a:t>програма</a:t>
             </a:r>
             <a:r>
               <a:rPr lang="en-US" sz="1200" dirty="0" smtClean="0">
@@ -5385,7 +5403,7 @@
               <a:rPr lang="en-US" sz="1200" dirty="0" err="1" smtClean="0">
                 <a:latin typeface="Buxton Sketch" pitchFamily="66" charset="0"/>
               </a:rPr>
-              <a:t>програма</a:t>
+              <a:t>за</a:t>
             </a:r>
             <a:r>
               <a:rPr lang="en-US" sz="1200" dirty="0" smtClean="0">
@@ -5397,7 +5415,7 @@
               <a:rPr lang="en-US" sz="1200" dirty="0" err="1" smtClean="0">
                 <a:latin typeface="Buxton Sketch" pitchFamily="66" charset="0"/>
               </a:rPr>
-              <a:t>за</a:t>
+              <a:t>управление</a:t>
             </a:r>
             <a:r>
               <a:rPr lang="en-US" sz="1200" dirty="0" smtClean="0">
@@ -5409,7 +5427,7 @@
               <a:rPr lang="en-US" sz="1200" dirty="0" err="1" smtClean="0">
                 <a:latin typeface="Buxton Sketch" pitchFamily="66" charset="0"/>
               </a:rPr>
-              <a:t>управление</a:t>
+              <a:t>на</a:t>
             </a:r>
             <a:r>
               <a:rPr lang="en-US" sz="1200" dirty="0" smtClean="0">
@@ -5421,6 +5439,30 @@
               <a:rPr lang="en-US" sz="1200" dirty="0" err="1" smtClean="0">
                 <a:latin typeface="Buxton Sketch" pitchFamily="66" charset="0"/>
               </a:rPr>
+              <a:t>отношенията</a:t>
+            </a:r>
+            <a:r>
+              <a:rPr lang="en-US" sz="1200" dirty="0" smtClean="0">
+                <a:latin typeface="Buxton Sketch" pitchFamily="66" charset="0"/>
+              </a:rPr>
+              <a:t> и в </a:t>
+            </a:r>
+            <a:r>
+              <a:rPr lang="en-US" sz="1200" dirty="0" err="1" smtClean="0">
+                <a:latin typeface="Buxton Sketch" pitchFamily="66" charset="0"/>
+              </a:rPr>
+              <a:t>продължение</a:t>
+            </a:r>
+            <a:r>
+              <a:rPr lang="en-US" sz="1200" dirty="0" smtClean="0">
+                <a:latin typeface="Buxton Sketch" pitchFamily="66" charset="0"/>
+              </a:rPr>
+              <a:t> </a:t>
+            </a:r>
+            <a:r>
+              <a:rPr lang="en-US" sz="1200" dirty="0" err="1" smtClean="0">
+                <a:latin typeface="Buxton Sketch" pitchFamily="66" charset="0"/>
+              </a:rPr>
               <a:t>на</a:t>
             </a:r>
             <a:r>
@@ -5433,19 +5475,19 @@
               <a:rPr lang="en-US" sz="1200" dirty="0" err="1" smtClean="0">
                 <a:latin typeface="Buxton Sketch" pitchFamily="66" charset="0"/>
               </a:rPr>
-              <a:t>отношенията</a:t>
+              <a:t>времето</a:t>
             </a:r>
             <a:r>
               <a:rPr lang="en-US" sz="1200" dirty="0" smtClean="0">
                 <a:latin typeface="Buxton Sketch" pitchFamily="66" charset="0"/>
               </a:rPr>
-              <a:t> и в </a:t>
+              <a:t> </a:t>
             </a:r>
             <a:r>
               <a:rPr lang="en-US" sz="1200" dirty="0" err="1" smtClean="0">
                 <a:latin typeface="Buxton Sketch" pitchFamily="66" charset="0"/>
               </a:rPr>
-              <a:t>продължение</a:t>
+              <a:t>на</a:t>
             </a:r>
             <a:r>
               <a:rPr lang="en-US" sz="1200" dirty="0" smtClean="0">
@@ -5457,73 +5499,31 @@
               <a:rPr lang="en-US" sz="1200" dirty="0" err="1" smtClean="0">
                 <a:latin typeface="Buxton Sketch" pitchFamily="66" charset="0"/>
               </a:rPr>
-              <a:t>на</a:t>
+              <a:t>работа</a:t>
+            </a:r>
+            <a:r>
+              <a:rPr lang="bg-BG" sz="1200" dirty="0" smtClean="0">
+                <a:latin typeface="Buxton Sketch" pitchFamily="66" charset="0"/>
+              </a:rPr>
+              <a:t>-</a:t>
+            </a:r>
+            <a:r>
+              <a:rPr lang="en-US" sz="1200" dirty="0" err="1" smtClean="0">
+                <a:latin typeface="Buxton Sketch" pitchFamily="66" charset="0"/>
+              </a:rPr>
+              <a:t>настройва</a:t>
+            </a:r>
+            <a:r>
+              <a:rPr lang="bg-BG" sz="1200" dirty="0" smtClean="0">
+                <a:latin typeface="Buxton Sketch" pitchFamily="66" charset="0"/>
+              </a:rPr>
+              <a:t>не</a:t>
             </a:r>
             <a:r>
               <a:rPr lang="en-US" sz="1200" dirty="0" smtClean="0">
                 <a:latin typeface="Buxton Sketch" pitchFamily="66" charset="0"/>
               </a:rPr>
-              <a:t> </a:t>
-            </a:r>
-            <a:r>
-              <a:rPr lang="en-US" sz="1200" dirty="0" err="1" smtClean="0">
-                <a:latin typeface="Buxton Sketch" pitchFamily="66" charset="0"/>
-              </a:rPr>
-              <a:t>времето</a:t>
-            </a:r>
-            <a:r>
-              <a:rPr lang="en-US" sz="1200" dirty="0" smtClean="0">
-                <a:latin typeface="Buxton Sketch" pitchFamily="66" charset="0"/>
-              </a:rPr>
-              <a:t> </a:t>
-            </a:r>
-            <a:r>
-              <a:rPr lang="en-US" sz="1200" dirty="0" err="1" smtClean="0">
-                <a:latin typeface="Buxton Sketch" pitchFamily="66" charset="0"/>
-              </a:rPr>
-              <a:t>на</a:t>
-            </a:r>
-            <a:r>
-              <a:rPr lang="en-US" sz="1200" dirty="0" smtClean="0">
-                <a:latin typeface="Buxton Sketch" pitchFamily="66" charset="0"/>
-              </a:rPr>
-              <a:t> </a:t>
-            </a:r>
-            <a:r>
-              <a:rPr lang="en-US" sz="1200" dirty="0" err="1" smtClean="0">
-                <a:latin typeface="Buxton Sketch" pitchFamily="66" charset="0"/>
-              </a:rPr>
-              <a:t>работа</a:t>
-            </a:r>
-            <a:r>
-              <a:rPr lang="bg-BG" sz="1200" dirty="0" smtClean="0">
-                <a:latin typeface="Buxton Sketch" pitchFamily="66" charset="0"/>
-              </a:rPr>
-              <a:t>-</a:t>
-            </a:r>
-            <a:r>
-              <a:rPr lang="en-US" sz="1200" dirty="0" err="1" smtClean="0">
-                <a:latin typeface="Buxton Sketch" pitchFamily="66" charset="0"/>
-              </a:rPr>
-              <a:t>настройва</a:t>
-            </a:r>
-            <a:r>
-              <a:rPr lang="bg-BG" sz="1200" dirty="0" smtClean="0">
-                <a:latin typeface="Buxton Sketch" pitchFamily="66" charset="0"/>
-              </a:rPr>
-              <a:t>не</a:t>
-            </a:r>
-            <a:r>
-              <a:rPr lang="en-US" sz="1200" dirty="0" smtClean="0">
-                <a:latin typeface="Buxton Sketch" pitchFamily="66" charset="0"/>
-              </a:rPr>
-              <a:t> </a:t>
-            </a:r>
-            <a:r>
-              <a:rPr lang="en-US" sz="1200" dirty="0" smtClean="0">
-                <a:latin typeface="Buxton Sketch" pitchFamily="66" charset="0"/>
-              </a:rPr>
-              <a:t>и </a:t>
+              <a:t> и </a:t>
             </a:r>
             <a:r>
               <a:rPr lang="en-US" sz="1200" dirty="0" err="1" smtClean="0">
@@ -5690,6 +5690,13 @@
   <p:clrMapOvr>
     <a:masterClrMapping/>
   </p:clrMapOvr>
+  <p:timing>
+    <p:tnLst>
+      <p:par>
+        <p:cTn id="1" dur="indefinite" restart="never" nodeType="tmRoot"/>
+      </p:par>
+    </p:tnLst>
+  </p:timing>
 </p:sld>
 </file>
 
@@ -6030,16 +6037,22 @@
               <a:rPr lang="bg-BG" sz="1500" b="1" dirty="0" smtClean="0">
                 <a:latin typeface="Buxton Sketch" pitchFamily="66" charset="0"/>
               </a:rPr>
-              <a:t>HubSpot CRM – лесна за използване </a:t>
-            </a:r>
-            <a:r>
-              <a:rPr lang="en-US" sz="1500" b="1" dirty="0" smtClean="0">
+              <a:t>HubSpot </a:t>
+            </a:r>
+            <a:r>
+              <a:rPr lang="bg-BG" sz="1500" dirty="0" smtClean="0">
+                <a:latin typeface="Buxton Sketch" pitchFamily="66" charset="0"/>
+              </a:rPr>
+              <a:t>CRM – лесна за използване </a:t>
+            </a:r>
+            <a:r>
+              <a:rPr lang="en-US" sz="1500" dirty="0" smtClean="0">
                 <a:latin typeface="Buxton Sketch" pitchFamily="66" charset="0"/>
               </a:rPr>
               <a:t>CRM </a:t>
             </a:r>
             <a:r>
-              <a:rPr lang="bg-BG" sz="1500" b="1" dirty="0" smtClean="0">
+              <a:rPr lang="bg-BG" sz="1500" dirty="0" smtClean="0">
                 <a:latin typeface="Buxton Sketch" pitchFamily="66" charset="0"/>
               </a:rPr>
               <a:t>от малък и среден бизнес</a:t>
@@ -6063,13 +6076,19 @@
               <a:rPr lang="bg-BG" sz="1500" dirty="0" smtClean="0">
                 <a:latin typeface="Buxton Sketch" pitchFamily="66" charset="0"/>
               </a:rPr>
-              <a:t> – много добра вътрешна съвместимост с другите проукти на </a:t>
+              <a:t> – много добра вътрешна съвместимост с другите </a:t>
             </a:r>
             <a:r>
               <a:rPr lang="bg-BG" sz="1500" dirty="0" smtClean="0">
                 <a:latin typeface="Buxton Sketch" pitchFamily="66" charset="0"/>
               </a:rPr>
-              <a:t>производителя</a:t>
+              <a:t>продукти </a:t>
+            </a:r>
+            <a:r>
+              <a:rPr lang="bg-BG" sz="1500" dirty="0" smtClean="0">
+                <a:latin typeface="Buxton Sketch" pitchFamily="66" charset="0"/>
+              </a:rPr>
+              <a:t>на производителя</a:t>
             </a:r>
           </a:p>
           <a:p>
@@ -6087,7 +6106,25 @@
               <a:rPr lang="bg-BG" sz="1500" dirty="0" smtClean="0">
                 <a:latin typeface="Buxton Sketch" pitchFamily="66" charset="0"/>
               </a:rPr>
-              <a:t> – доста лесна за употреба, вграден идкуствен интелект за асистент, подходяща за стартиращи бизнеси</a:t>
+              <a:t> – доста лесна за употреба, вграден </a:t>
+            </a:r>
+            <a:r>
+              <a:rPr lang="bg-BG" sz="1500" dirty="0" smtClean="0">
+                <a:latin typeface="Buxton Sketch" pitchFamily="66" charset="0"/>
+              </a:rPr>
+              <a:t>из</a:t>
+            </a:r>
+            <a:r>
+              <a:rPr lang="bg-BG" sz="1500" dirty="0" smtClean="0">
+                <a:latin typeface="Buxton Sketch" pitchFamily="66" charset="0"/>
+              </a:rPr>
+              <a:t>куствен </a:t>
+            </a:r>
+            <a:r>
+              <a:rPr lang="bg-BG" sz="1500" dirty="0" smtClean="0">
+                <a:latin typeface="Buxton Sketch" pitchFamily="66" charset="0"/>
+              </a:rPr>
+              <a:t>интелект за асистент, подходяща за стартиращи бизнеси</a:t>
             </a:r>
             <a:endParaRPr lang="en-US" sz="1500" dirty="0" smtClean="0">
               <a:latin typeface="Buxton Sketch" pitchFamily="66" charset="0"/>
@@ -6108,7 +6145,19 @@
               <a:rPr lang="bg-BG" sz="1500" dirty="0" smtClean="0">
                 <a:latin typeface="Buxton Sketch" pitchFamily="66" charset="0"/>
               </a:rPr>
-              <a:t> – подходящо за стартиращи бизнеси, изключително достъпна</a:t>
+              <a:t> – </a:t>
+            </a:r>
+            <a:r>
+              <a:rPr lang="bg-BG" sz="1500" dirty="0" smtClean="0">
+                <a:latin typeface="Buxton Sketch" pitchFamily="66" charset="0"/>
+              </a:rPr>
+              <a:t>подходяща </a:t>
+            </a:r>
+            <a:r>
+              <a:rPr lang="bg-BG" sz="1500" dirty="0" smtClean="0">
+                <a:latin typeface="Buxton Sketch" pitchFamily="66" charset="0"/>
+              </a:rPr>
+              <a:t>за стартиращи бизнеси, изключително достъпна</a:t>
             </a:r>
             <a:endParaRPr lang="en-US" sz="1500" dirty="0" smtClean="0">
               <a:latin typeface="Buxton Sketch" pitchFamily="66" charset="0"/>
@@ -6183,13 +6232,19 @@
               <a:rPr lang="bg-BG" sz="1500" dirty="0" smtClean="0">
                 <a:latin typeface="Buxton Sketch" pitchFamily="66" charset="0"/>
               </a:rPr>
-              <a:t> и отчетен механизъм, подходяка за малък </a:t>
+              <a:t> и отчетен механизъм, </a:t>
             </a:r>
             <a:r>
               <a:rPr lang="bg-BG" sz="1500" dirty="0" smtClean="0">
                 <a:latin typeface="Buxton Sketch" pitchFamily="66" charset="0"/>
               </a:rPr>
-              <a:t>бизнес</a:t>
+              <a:t>подходяща </a:t>
+            </a:r>
+            <a:r>
+              <a:rPr lang="bg-BG" sz="1500" dirty="0" smtClean="0">
+                <a:latin typeface="Buxton Sketch" pitchFamily="66" charset="0"/>
+              </a:rPr>
+              <a:t>за малък бизнес</a:t>
             </a:r>
             <a:endParaRPr lang="en-US" sz="1500" dirty="0" smtClean="0">
               <a:latin typeface="Buxton Sketch" pitchFamily="66" charset="0"/>
@@ -6268,6 +6323,13 @@
   <p:clrMapOvr>
     <a:masterClrMapping/>
   </p:clrMapOvr>
+  <p:timing>
+    <p:tnLst>
+      <p:par>
+        <p:cTn id="1" dur="indefinite" restart="never" nodeType="tmRoot"/>
+      </p:par>
+    </p:tnLst>
+  </p:timing>
 </p:sld>
 </file>
 
@@ -6468,13 +6530,7 @@
               <a:rPr lang="en-US" sz="1600" dirty="0" smtClean="0">
                 <a:latin typeface="Buxton Sketch" pitchFamily="66" charset="0"/>
               </a:rPr>
-              <a:t> </a:t>
-            </a:r>
-            <a:r>
-              <a:rPr lang="en-US" sz="1600" dirty="0" smtClean="0">
-                <a:latin typeface="Buxton Sketch" pitchFamily="66" charset="0"/>
-              </a:rPr>
-              <a:t>и </a:t>
+              <a:t> и </a:t>
             </a:r>
             <a:r>
               <a:rPr lang="en-US" sz="1600" dirty="0" err="1" smtClean="0">
@@ -6733,12 +6789,6 @@
               <a:t>-</a:t>
             </a:r>
             <a:r>
-              <a:rPr lang="en-US" sz="1600" dirty="0" smtClean="0">
-                <a:latin typeface="Buxton Sketch" pitchFamily="66" charset="0"/>
-              </a:rPr>
-              <a:t> </a:t>
-            </a:r>
-            <a:r>
               <a:rPr lang="en-US" sz="1600" dirty="0" err="1" smtClean="0">
                 <a:latin typeface="Buxton Sketch" pitchFamily="66" charset="0"/>
               </a:rPr>
@@ -6963,13 +7013,7 @@
               <a:rPr lang="en-US" sz="1600" dirty="0" smtClean="0">
                 <a:latin typeface="Buxton Sketch" pitchFamily="66" charset="0"/>
               </a:rPr>
-              <a:t> </a:t>
-            </a:r>
-            <a:r>
-              <a:rPr lang="en-US" sz="1600" dirty="0" smtClean="0">
-                <a:latin typeface="Buxton Sketch" pitchFamily="66" charset="0"/>
-              </a:rPr>
-              <a:t>и </a:t>
+              <a:t> и </a:t>
             </a:r>
             <a:r>
               <a:rPr lang="en-US" sz="1600" dirty="0" err="1" smtClean="0">
@@ -6998,7 +7042,13 @@
               <a:rPr lang="bg-BG" sz="1600" dirty="0" smtClean="0">
                 <a:latin typeface="Buxton Sketch" pitchFamily="66" charset="0"/>
               </a:rPr>
-              <a:t>ване на </a:t>
+              <a:t>ане </a:t>
+            </a:r>
+            <a:r>
+              <a:rPr lang="bg-BG" sz="1600" dirty="0" smtClean="0">
+                <a:latin typeface="Buxton Sketch" pitchFamily="66" charset="0"/>
+              </a:rPr>
+              <a:t>на </a:t>
             </a:r>
             <a:r>
               <a:rPr lang="en-US" sz="1600" b="1" dirty="0" err="1" smtClean="0">
@@ -7388,6 +7438,13 @@
   <p:clrMapOvr>
     <a:masterClrMapping/>
   </p:clrMapOvr>
+  <p:timing>
+    <p:tnLst>
+      <p:par>
+        <p:cTn id="1" dur="indefinite" restart="never" nodeType="tmRoot"/>
+      </p:par>
+    </p:tnLst>
+  </p:timing>
 </p:sld>
 </file>
 
@@ -7474,13 +7531,7 @@
               <a:rPr lang="en-US" sz="1700" b="1" dirty="0" smtClean="0">
                 <a:latin typeface="Buxton Sketch" pitchFamily="66" charset="0"/>
               </a:rPr>
-              <a:t> </a:t>
-            </a:r>
-            <a:r>
-              <a:rPr lang="en-US" sz="1700" b="1" dirty="0" smtClean="0">
-                <a:latin typeface="Buxton Sketch" pitchFamily="66" charset="0"/>
-              </a:rPr>
-              <a:t>и </a:t>
+              <a:t> и </a:t>
             </a:r>
             <a:r>
               <a:rPr lang="en-US" sz="1700" b="1" dirty="0" err="1" smtClean="0">
@@ -7684,13 +7735,7 @@
               <a:rPr lang="en-US" sz="1500" dirty="0" smtClean="0">
                 <a:latin typeface="Buxton Sketch" pitchFamily="66" charset="0"/>
               </a:rPr>
-              <a:t> </a:t>
-            </a:r>
-            <a:r>
-              <a:rPr lang="en-US" sz="1500" dirty="0" smtClean="0">
-                <a:latin typeface="Buxton Sketch" pitchFamily="66" charset="0"/>
-              </a:rPr>
-              <a:t>и </a:t>
+              <a:t> и </a:t>
             </a:r>
             <a:r>
               <a:rPr lang="en-US" sz="1500" dirty="0" err="1" smtClean="0">
@@ -8166,13 +8211,7 @@
               <a:rPr lang="en-US" sz="1500" b="1" dirty="0" smtClean="0">
                 <a:latin typeface="Buxton Sketch" pitchFamily="66" charset="0"/>
               </a:rPr>
-              <a:t> </a:t>
-            </a:r>
-            <a:r>
-              <a:rPr lang="en-US" sz="1500" b="1" dirty="0" smtClean="0">
-                <a:latin typeface="Buxton Sketch" pitchFamily="66" charset="0"/>
-              </a:rPr>
-              <a:t>е </a:t>
+              <a:t> е </a:t>
             </a:r>
             <a:r>
               <a:rPr lang="en-US" sz="1500" b="1" dirty="0" err="1" smtClean="0">
@@ -8427,7 +8466,19 @@
               <a:rPr lang="en-US" sz="1500" b="1" dirty="0" err="1" smtClean="0">
                 <a:latin typeface="Buxton Sketch" pitchFamily="66" charset="0"/>
               </a:rPr>
-              <a:t>определни</a:t>
+              <a:t>определ</a:t>
+            </a:r>
+            <a:r>
+              <a:rPr lang="bg-BG" sz="1500" b="1" dirty="0" smtClean="0">
+                <a:latin typeface="Buxton Sketch" pitchFamily="66" charset="0"/>
+              </a:rPr>
+              <a:t>е</a:t>
+            </a:r>
+            <a:r>
+              <a:rPr lang="en-US" sz="1500" b="1" dirty="0" err="1" smtClean="0">
+                <a:latin typeface="Buxton Sketch" pitchFamily="66" charset="0"/>
+              </a:rPr>
+              <a:t>ни</a:t>
             </a:r>
             <a:r>
               <a:rPr lang="en-US" sz="1500" b="1" dirty="0" smtClean="0">
@@ -8726,9 +8777,6 @@
               </a:rPr>
               <a:t>.</a:t>
             </a:r>
-            <a:endParaRPr lang="en-US" sz="1500" dirty="0" smtClean="0">
-              <a:latin typeface="Buxton Sketch" pitchFamily="66" charset="0"/>
-            </a:endParaRPr>
           </a:p>
           <a:p>
             <a:pPr>
@@ -9242,6 +9290,13 @@
   <p:clrMapOvr>
     <a:masterClrMapping/>
   </p:clrMapOvr>
+  <p:timing>
+    <p:tnLst>
+      <p:par>
+        <p:cTn id="1" dur="indefinite" restart="never" nodeType="tmRoot"/>
+      </p:par>
+    </p:tnLst>
+  </p:timing>
 </p:sld>
 </file>
 
@@ -9378,6 +9433,13 @@
   <p:clrMapOvr>
     <a:masterClrMapping/>
   </p:clrMapOvr>
+  <p:timing>
+    <p:tnLst>
+      <p:par>
+        <p:cTn id="1" dur="indefinite" restart="never" nodeType="tmRoot"/>
+      </p:par>
+    </p:tnLst>
+  </p:timing>
 </p:sld>
 </file>
 
@@ -9457,13 +9519,7 @@
               <a:rPr lang="en-US" sz="2900" dirty="0" smtClean="0">
                 <a:latin typeface="Buxton Sketch" pitchFamily="66" charset="0"/>
               </a:rPr>
-              <a:t>[</a:t>
-            </a:r>
-            <a:r>
-              <a:rPr lang="en-US" sz="2900" dirty="0" smtClean="0">
-                <a:latin typeface="Buxton Sketch" pitchFamily="66" charset="0"/>
-              </a:rPr>
-              <a:t>1]</a:t>
+              <a:t>[1]</a:t>
             </a:r>
             <a:r>
               <a:rPr lang="en-US" sz="2900" b="1" dirty="0" smtClean="0">
@@ -9502,13 +9558,7 @@
               <a:rPr lang="en-US" sz="2900" dirty="0" smtClean="0">
                 <a:latin typeface="Buxton Sketch" pitchFamily="66" charset="0"/>
               </a:rPr>
-              <a:t>[</a:t>
-            </a:r>
-            <a:r>
-              <a:rPr lang="en-US" sz="2900" dirty="0" smtClean="0">
-                <a:latin typeface="Buxton Sketch" pitchFamily="66" charset="0"/>
-              </a:rPr>
-              <a:t>2] Customer relationship management, </a:t>
+              <a:t>[2] Customer relationship management, </a:t>
             </a:r>
             <a:r>
               <a:rPr lang="en-US" sz="2900" dirty="0" smtClean="0">
@@ -9543,13 +9593,7 @@
               <a:rPr lang="en-US" sz="2900" dirty="0" smtClean="0">
                 <a:latin typeface="Buxton Sketch" pitchFamily="66" charset="0"/>
               </a:rPr>
-              <a:t>[</a:t>
-            </a:r>
-            <a:r>
-              <a:rPr lang="en-US" sz="2900" dirty="0" smtClean="0">
-                <a:latin typeface="Buxton Sketch" pitchFamily="66" charset="0"/>
-              </a:rPr>
-              <a:t>3] Comparison of CRM systems</a:t>
+              <a:t>[3] Comparison of CRM systems</a:t>
             </a:r>
             <a:r>
               <a:rPr lang="en-US" sz="2900" i="1" dirty="0" smtClean="0">
@@ -9590,13 +9634,7 @@
               <a:rPr lang="en-US" sz="2900" dirty="0" smtClean="0">
                 <a:latin typeface="Buxton Sketch" pitchFamily="66" charset="0"/>
               </a:rPr>
-              <a:t>[</a:t>
-            </a:r>
-            <a:r>
-              <a:rPr lang="en-US" sz="2900" dirty="0" smtClean="0">
-                <a:latin typeface="Buxton Sketch" pitchFamily="66" charset="0"/>
-              </a:rPr>
-              <a:t>4] The Best CRM Software for 2020, </a:t>
+              <a:t>[4] The Best CRM Software for 2020, </a:t>
             </a:r>
             <a:endParaRPr lang="en-US" sz="2900" b="1" dirty="0" smtClean="0">
               <a:latin typeface="Buxton Sketch" pitchFamily="66" charset="0"/>
@@ -9618,14 +9656,7 @@
                 <a:latin typeface="Buxton Sketch" pitchFamily="66" charset="0"/>
                 <a:hlinkClick r:id="rId5"/>
               </a:rPr>
-              <a:t>https</a:t>
-            </a:r>
-            <a:r>
-              <a:rPr lang="en-US" sz="2900" dirty="0" smtClean="0">
-                <a:latin typeface="Buxton Sketch" pitchFamily="66" charset="0"/>
-                <a:hlinkClick r:id="rId5"/>
-              </a:rPr>
-              <a:t>://www.pcmag.com/picks/the-best-crm-software</a:t>
+              <a:t>https://www.pcmag.com/picks/the-best-crm-software</a:t>
             </a:r>
             <a:endParaRPr lang="en-US" sz="2900" b="1" dirty="0" smtClean="0">
               <a:latin typeface="Buxton Sketch" pitchFamily="66" charset="0"/>
@@ -9653,13 +9684,7 @@
               <a:rPr lang="en-US" sz="2900" b="1" dirty="0" smtClean="0">
                 <a:latin typeface="Buxton Sketch" pitchFamily="66" charset="0"/>
               </a:rPr>
-              <a:t>[</a:t>
-            </a:r>
-            <a:r>
-              <a:rPr lang="en-US" sz="2900" b="1" dirty="0" smtClean="0">
-                <a:latin typeface="Buxton Sketch" pitchFamily="66" charset="0"/>
-              </a:rPr>
-              <a:t>5] Technological differences </a:t>
+              <a:t>[5] Technological differences </a:t>
             </a:r>
             <a:r>
               <a:rPr lang="en-US" sz="2900" b="1" dirty="0" err="1" smtClean="0">
@@ -9693,14 +9718,7 @@
                 <a:latin typeface="Buxton Sketch" pitchFamily="66" charset="0"/>
                 <a:hlinkClick r:id="rId6"/>
               </a:rPr>
-              <a:t>https</a:t>
-            </a:r>
-            <a:r>
-              <a:rPr lang="en-US" sz="2900" b="1" dirty="0" smtClean="0">
-                <a:latin typeface="Buxton Sketch" pitchFamily="66" charset="0"/>
-                <a:hlinkClick r:id="rId6"/>
-              </a:rPr>
-              <a:t>://www.researchgate.net/publication/242473976_TECHNOLOGICAL_DIFFERENCES_BETWEEN_CRM_AND_eCRM/fulltext/5e36cd8192851c7f7f165230/TECHNOLOGICAL-DIFFERENCES-BETWEEN-CRM-AND-eCRM.pdf</a:t>
+              <a:t>https://www.researchgate.net/publication/242473976_TECHNOLOGICAL_DIFFERENCES_BETWEEN_CRM_AND_eCRM/fulltext/5e36cd8192851c7f7f165230/TECHNOLOGICAL-DIFFERENCES-BETWEEN-CRM-AND-eCRM.pdf</a:t>
             </a:r>
             <a:endParaRPr lang="en-US" sz="2900" dirty="0" smtClean="0">
               <a:latin typeface="Buxton Sketch" pitchFamily="66" charset="0"/>
@@ -9728,13 +9746,7 @@
               <a:rPr lang="en-US" sz="2900" dirty="0" smtClean="0">
                 <a:latin typeface="Buxton Sketch" pitchFamily="66" charset="0"/>
               </a:rPr>
-              <a:t>[</a:t>
-            </a:r>
-            <a:r>
-              <a:rPr lang="en-US" sz="2900" dirty="0" smtClean="0">
-                <a:latin typeface="Buxton Sketch" pitchFamily="66" charset="0"/>
-              </a:rPr>
-              <a:t>6] </a:t>
+              <a:t>[6] </a:t>
             </a:r>
             <a:r>
               <a:rPr lang="bg-BG" sz="2900" dirty="0" smtClean="0">
@@ -9763,13 +9775,7 @@
               <a:rPr lang="en-US" sz="2900" dirty="0" smtClean="0">
                 <a:latin typeface="Buxton Sketch" pitchFamily="66" charset="0"/>
               </a:rPr>
-              <a:t>http</a:t>
-            </a:r>
-            <a:r>
-              <a:rPr lang="en-US" sz="2900" dirty="0" smtClean="0">
-                <a:latin typeface="Buxton Sketch" pitchFamily="66" charset="0"/>
-              </a:rPr>
-              <a:t>://www.cfinance.bg/CRM.html</a:t>
+              <a:t>http://www.cfinance.bg/CRM.html</a:t>
             </a:r>
           </a:p>
           <a:p>
@@ -9785,6 +9791,13 @@
   <p:clrMapOvr>
     <a:masterClrMapping/>
   </p:clrMapOvr>
+  <p:timing>
+    <p:tnLst>
+      <p:par>
+        <p:cTn id="1" dur="indefinite" restart="never" nodeType="tmRoot"/>
+      </p:par>
+    </p:tnLst>
+  </p:timing>
 </p:sld>
 </file>
 
@@ -9905,6 +9918,13 @@
   <p:clrMapOvr>
     <a:masterClrMapping/>
   </p:clrMapOvr>
+  <p:timing>
+    <p:tnLst>
+      <p:par>
+        <p:cTn id="1" dur="indefinite" restart="never" nodeType="tmRoot"/>
+      </p:par>
+    </p:tnLst>
+  </p:timing>
 </p:sld>
 </file>
 
@@ -10663,13 +10683,7 @@
               <a:rPr lang="bg-BG" sz="1600" dirty="0" smtClean="0">
                 <a:latin typeface="Buxton Sketch" pitchFamily="66" charset="0"/>
               </a:rPr>
-              <a:t> </a:t>
-            </a:r>
-            <a:r>
-              <a:rPr lang="bg-BG" sz="1600" dirty="0" smtClean="0">
-                <a:latin typeface="Buxton Sketch" pitchFamily="66" charset="0"/>
-              </a:rPr>
-              <a:t>- </a:t>
+              <a:t> - </a:t>
             </a:r>
             <a:r>
               <a:rPr lang="en-US" sz="1600" dirty="0" err="1" smtClean="0">
@@ -11386,7 +11400,7 @@
               <a:rPr lang="bg-BG" sz="1600" dirty="0" smtClean="0">
                 <a:latin typeface="Buxton Sketch" pitchFamily="66" charset="0"/>
               </a:rPr>
-              <a:t> </a:t>
+              <a:t> на </a:t>
             </a:r>
             <a:r>
               <a:rPr lang="en-US" sz="1600" dirty="0" err="1" smtClean="0">
@@ -12682,13 +12696,7 @@
               <a:rPr lang="en-US" sz="1600" dirty="0" smtClean="0">
                 <a:latin typeface="Buxton Sketch" pitchFamily="66" charset="0"/>
               </a:rPr>
-              <a:t> </a:t>
-            </a:r>
-            <a:r>
-              <a:rPr lang="en-US" sz="1600" dirty="0" smtClean="0">
-                <a:latin typeface="Buxton Sketch" pitchFamily="66" charset="0"/>
-              </a:rPr>
-              <a:t>start-up-</a:t>
+              <a:t> start-up-</a:t>
             </a:r>
             <a:r>
               <a:rPr lang="en-US" sz="1600" dirty="0" err="1" smtClean="0">
@@ -12930,13 +12938,7 @@
               <a:rPr lang="en-US" sz="1600" dirty="0" smtClean="0">
                 <a:latin typeface="Buxton Sketch" pitchFamily="66" charset="0"/>
               </a:rPr>
-              <a:t> </a:t>
-            </a:r>
-            <a:r>
-              <a:rPr lang="en-US" sz="1600" dirty="0" smtClean="0">
-                <a:latin typeface="Buxton Sketch" pitchFamily="66" charset="0"/>
-              </a:rPr>
-              <a:t>и </a:t>
+              <a:t> и </a:t>
             </a:r>
             <a:r>
               <a:rPr lang="en-US" sz="1600" dirty="0" err="1" smtClean="0">
@@ -14627,7 +14629,13 @@
               <a:rPr lang="en-US" sz="1600" dirty="0" err="1" smtClean="0">
                 <a:latin typeface="Buxton Sketch" pitchFamily="66" charset="0"/>
               </a:rPr>
-              <a:t>инструменти</a:t>
+              <a:t>инструмен</a:t>
+            </a:r>
+            <a:r>
+              <a:rPr lang="bg-BG" sz="1600" dirty="0" smtClean="0">
+                <a:latin typeface="Buxton Sketch" pitchFamily="66" charset="0"/>
+              </a:rPr>
+              <a:t>та</a:t>
             </a:r>
             <a:r>
               <a:rPr lang="en-US" sz="1600" dirty="0" smtClean="0">
@@ -14762,13 +14770,7 @@
               <a:rPr lang="en-US" sz="1600" dirty="0" smtClean="0">
                 <a:latin typeface="Buxton Sketch" pitchFamily="66" charset="0"/>
               </a:rPr>
-              <a:t> </a:t>
-            </a:r>
-            <a:r>
-              <a:rPr lang="en-US" sz="1600" dirty="0" smtClean="0">
-                <a:latin typeface="Buxton Sketch" pitchFamily="66" charset="0"/>
-              </a:rPr>
-              <a:t>Enterprise resource planning (ERP) </a:t>
+              <a:t> Enterprise resource planning (ERP) </a:t>
             </a:r>
             <a:r>
               <a:rPr lang="en-US" sz="1600" dirty="0" err="1" smtClean="0">
@@ -15324,13 +15326,7 @@
               <a:rPr lang="en-US" sz="1600" dirty="0" smtClean="0">
                 <a:latin typeface="Buxton Sketch" pitchFamily="66" charset="0"/>
               </a:rPr>
-              <a:t>1986-</a:t>
-            </a:r>
-            <a:r>
-              <a:rPr lang="en-US" sz="1600" dirty="0" smtClean="0">
-                <a:latin typeface="Buxton Sketch" pitchFamily="66" charset="0"/>
-              </a:rPr>
-              <a:t>Pat Sullivan и Mike </a:t>
+              <a:t>1986-Pat Sullivan и Mike </a:t>
             </a:r>
             <a:r>
               <a:rPr lang="en-US" sz="1600" dirty="0" err="1" smtClean="0">
@@ -15393,31 +15389,7 @@
               <a:rPr lang="en-US" sz="1700" dirty="0" smtClean="0">
                 <a:latin typeface="Buxton Sketch" pitchFamily="66" charset="0"/>
               </a:rPr>
-              <a:t>-</a:t>
-            </a:r>
-            <a:r>
-              <a:rPr lang="en-US" sz="1700" dirty="0" smtClean="0">
-                <a:latin typeface="Buxton Sketch" pitchFamily="66" charset="0"/>
-              </a:rPr>
-              <a:t>Tom </a:t>
-            </a:r>
-            <a:r>
-              <a:rPr lang="en-US" sz="1700" dirty="0" smtClean="0">
-                <a:latin typeface="Buxton Sketch" pitchFamily="66" charset="0"/>
-              </a:rPr>
-              <a:t>Siebel, </a:t>
-            </a:r>
-            <a:r>
-              <a:rPr lang="en-US" sz="1700" dirty="0" smtClean="0">
-                <a:latin typeface="Buxton Sketch" pitchFamily="66" charset="0"/>
-              </a:rPr>
-              <a:t>Siebel </a:t>
-            </a:r>
-            <a:r>
-              <a:rPr lang="en-US" sz="1700" dirty="0" smtClean="0">
-                <a:latin typeface="Buxton Sketch" pitchFamily="66" charset="0"/>
-              </a:rPr>
-              <a:t>Systems - </a:t>
+              <a:t>-Tom Siebel, Siebel Systems - </a:t>
             </a:r>
             <a:r>
               <a:rPr lang="en-US" sz="1700" dirty="0" err="1" smtClean="0">
@@ -16006,13 +15978,7 @@
               <a:rPr lang="en-US" sz="1600" dirty="0" smtClean="0">
                 <a:latin typeface="Buxton Sketch" pitchFamily="66" charset="0"/>
               </a:rPr>
-              <a:t> </a:t>
-            </a:r>
-            <a:r>
-              <a:rPr lang="en-US" sz="1600" dirty="0" smtClean="0">
-                <a:latin typeface="Buxton Sketch" pitchFamily="66" charset="0"/>
-              </a:rPr>
-              <a:t>в </a:t>
+              <a:t> в </a:t>
             </a:r>
             <a:r>
               <a:rPr lang="en-US" sz="1600" dirty="0" err="1" smtClean="0">
@@ -16998,10 +16964,10 @@
               <a:t>кампании</a:t>
             </a:r>
             <a:r>
-              <a:rPr lang="bg-BG" sz="1700" dirty="0" smtClean="0">
-                <a:latin typeface="Buxton Sketch" pitchFamily="66" charset="0"/>
-              </a:rPr>
-              <a:t>М</a:t>
+              <a:rPr lang="en-US" sz="1700" dirty="0" smtClean="0">
+                <a:latin typeface="Buxton Sketch" pitchFamily="66" charset="0"/>
+              </a:rPr>
+              <a:t>:</a:t>
             </a:r>
             <a:endParaRPr lang="en-US" sz="1700" dirty="0" smtClean="0">
               <a:latin typeface="Buxton Sketch" pitchFamily="66" charset="0"/>
@@ -17455,13 +17421,7 @@
               <a:rPr lang="bg-BG" sz="4400" dirty="0" smtClean="0">
                 <a:latin typeface="Buxton Sketch" pitchFamily="66" charset="0"/>
               </a:rPr>
-              <a:t>.</a:t>
-            </a:r>
-            <a:r>
-              <a:rPr lang="bg-BG" sz="4400" dirty="0" smtClean="0">
-                <a:latin typeface="Buxton Sketch" pitchFamily="66" charset="0"/>
-              </a:rPr>
-              <a:t> Начин на работа </a:t>
+              <a:t>. Начин на работа </a:t>
             </a:r>
             <a:endParaRPr lang="en-US" sz="4400" dirty="0">
               <a:latin typeface="Buxton Sketch" pitchFamily="66" charset="0"/>
@@ -17549,19 +17509,7 @@
               <a:rPr lang="en-US" sz="1400" dirty="0" smtClean="0">
                 <a:latin typeface="Buxton Sketch" pitchFamily="66" charset="0"/>
               </a:rPr>
-              <a:t>(World </a:t>
-            </a:r>
-            <a:r>
-              <a:rPr lang="en-US" sz="1400" dirty="0" smtClean="0">
-                <a:latin typeface="Buxton Sketch" pitchFamily="66" charset="0"/>
-              </a:rPr>
-              <a:t>Wide </a:t>
-            </a:r>
-            <a:r>
-              <a:rPr lang="en-US" sz="1400" dirty="0" smtClean="0">
-                <a:latin typeface="Buxton Sketch" pitchFamily="66" charset="0"/>
-              </a:rPr>
-              <a:t>Web)</a:t>
+              <a:t>(World Wide Web)</a:t>
             </a:r>
             <a:endParaRPr lang="bg-BG" sz="1400" dirty="0" smtClean="0">
               <a:latin typeface="Buxton Sketch" pitchFamily="66" charset="0"/>
@@ -18251,13 +18199,7 @@
               <a:rPr lang="bg-BG" sz="1400" dirty="0" smtClean="0">
                 <a:latin typeface="Buxton Sketch" pitchFamily="66" charset="0"/>
               </a:rPr>
-              <a:t>С</a:t>
-            </a:r>
-            <a:r>
-              <a:rPr lang="bg-BG" sz="1400" dirty="0" smtClean="0">
-                <a:latin typeface="Buxton Sketch" pitchFamily="66" charset="0"/>
-              </a:rPr>
-              <a:t> </a:t>
+              <a:t>С </a:t>
             </a:r>
             <a:r>
               <a:rPr lang="en-US" sz="1400" dirty="0" err="1" smtClean="0">
@@ -18375,6 +18317,13 @@
   <p:clrMapOvr>
     <a:masterClrMapping/>
   </p:clrMapOvr>
+  <p:timing>
+    <p:tnLst>
+      <p:par>
+        <p:cTn id="1" dur="indefinite" restart="never" nodeType="tmRoot"/>
+      </p:par>
+    </p:tnLst>
+  </p:timing>
 </p:sld>
 </file>
 
@@ -18456,13 +18405,7 @@
               <a:rPr lang="bg-BG" sz="1400" dirty="0" smtClean="0">
                 <a:latin typeface="Buxton Sketch" pitchFamily="66" charset="0"/>
               </a:rPr>
-              <a:t> </a:t>
-            </a:r>
-            <a:r>
-              <a:rPr lang="bg-BG" sz="1400" dirty="0" smtClean="0">
-                <a:latin typeface="Buxton Sketch" pitchFamily="66" charset="0"/>
-              </a:rPr>
-              <a:t>– значително се популяризира, </a:t>
+              <a:t> – значително се популяризира, </a:t>
             </a:r>
             <a:r>
               <a:rPr lang="en-US" sz="1400" dirty="0" err="1" smtClean="0">
@@ -18510,13 +18453,7 @@
               <a:rPr lang="en-US" sz="1400" dirty="0" smtClean="0">
                 <a:latin typeface="Buxton Sketch" pitchFamily="66" charset="0"/>
               </a:rPr>
-              <a:t> Siebel, Gartner и </a:t>
-            </a:r>
-            <a:r>
-              <a:rPr lang="en-US" sz="1400" dirty="0" smtClean="0">
-                <a:latin typeface="Buxton Sketch" pitchFamily="66" charset="0"/>
-              </a:rPr>
-              <a:t>IBM</a:t>
+              <a:t> Siebel, Gartner и IBM</a:t>
             </a:r>
             <a:endParaRPr lang="bg-BG" sz="1400" dirty="0" smtClean="0">
               <a:latin typeface="Buxton Sketch" pitchFamily="66" charset="0"/>
@@ -18579,13 +18516,7 @@
               <a:rPr lang="en-US" sz="1400" dirty="0" smtClean="0">
                 <a:latin typeface="Buxton Sketch" pitchFamily="66" charset="0"/>
               </a:rPr>
-              <a:t> </a:t>
-            </a:r>
-            <a:r>
-              <a:rPr lang="en-US" sz="1400" dirty="0" smtClean="0">
-                <a:latin typeface="Buxton Sketch" pitchFamily="66" charset="0"/>
-              </a:rPr>
-              <a:t>с </a:t>
+              <a:t> с </a:t>
             </a:r>
             <a:r>
               <a:rPr lang="en-US" sz="1400" dirty="0" err="1" smtClean="0">
@@ -18708,13 +18639,7 @@
               <a:rPr lang="en-US" sz="1400" dirty="0" smtClean="0">
                 <a:latin typeface="Buxton Sketch" pitchFamily="66" charset="0"/>
               </a:rPr>
-              <a:t> Siebel Sales </a:t>
-            </a:r>
-            <a:r>
-              <a:rPr lang="en-US" sz="1400" dirty="0" smtClean="0">
-                <a:latin typeface="Buxton Sketch" pitchFamily="66" charset="0"/>
-              </a:rPr>
-              <a:t>Handheld</a:t>
+              <a:t> Siebel Sales Handheld</a:t>
             </a:r>
             <a:endParaRPr lang="bg-BG" sz="1400" dirty="0" smtClean="0">
               <a:latin typeface="Buxton Sketch" pitchFamily="66" charset="0"/>
@@ -18876,13 +18801,7 @@
               <a:rPr lang="en-US" sz="1400" dirty="0" smtClean="0">
                 <a:latin typeface="Buxton Sketch" pitchFamily="66" charset="0"/>
               </a:rPr>
-              <a:t> </a:t>
-            </a:r>
-            <a:r>
-              <a:rPr lang="en-US" sz="1400" dirty="0" smtClean="0">
-                <a:latin typeface="Buxton Sketch" pitchFamily="66" charset="0"/>
-              </a:rPr>
-              <a:t>open-source CRM </a:t>
+              <a:t> open-source CRM </a:t>
             </a:r>
             <a:r>
               <a:rPr lang="en-US" sz="1400" dirty="0" err="1" smtClean="0">
@@ -19572,6 +19491,13 @@
   <p:clrMapOvr>
     <a:masterClrMapping/>
   </p:clrMapOvr>
+  <p:timing>
+    <p:tnLst>
+      <p:par>
+        <p:cTn id="1" dur="indefinite" restart="never" nodeType="tmRoot"/>
+      </p:par>
+    </p:tnLst>
+  </p:timing>
 </p:sld>
 </file>
 
@@ -20698,13 +20624,7 @@
               <a:rPr lang="en-US" sz="1500" dirty="0" smtClean="0">
                 <a:latin typeface="Buxton Sketch" pitchFamily="66" charset="0"/>
               </a:rPr>
-              <a:t> </a:t>
-            </a:r>
-            <a:r>
-              <a:rPr lang="en-US" sz="1500" dirty="0" smtClean="0">
-                <a:latin typeface="Buxton Sketch" pitchFamily="66" charset="0"/>
-              </a:rPr>
-              <a:t>с </a:t>
+              <a:t> с </a:t>
             </a:r>
             <a:r>
               <a:rPr lang="en-US" sz="1500" dirty="0" err="1" smtClean="0">
@@ -20902,13 +20822,7 @@
               <a:rPr lang="en-US" sz="1500" dirty="0" smtClean="0">
                 <a:latin typeface="Buxton Sketch" pitchFamily="66" charset="0"/>
               </a:rPr>
-              <a:t> </a:t>
-            </a:r>
-            <a:r>
-              <a:rPr lang="en-US" sz="1500" dirty="0" smtClean="0">
-                <a:latin typeface="Buxton Sketch" pitchFamily="66" charset="0"/>
-              </a:rPr>
-              <a:t>и </a:t>
+              <a:t> и </a:t>
             </a:r>
             <a:r>
               <a:rPr lang="en-US" sz="1500" dirty="0" err="1" smtClean="0">
@@ -21464,13 +21378,19 @@
               <a:rPr lang="en-US" sz="1600" dirty="0" err="1" smtClean="0">
                 <a:latin typeface="Buxton Sketch" pitchFamily="66" charset="0"/>
               </a:rPr>
-              <a:t>местоположетие</a:t>
-            </a:r>
-            <a:r>
-              <a:rPr lang="en-US" sz="1600" dirty="0" smtClean="0">
-                <a:latin typeface="Buxton Sketch" pitchFamily="66" charset="0"/>
-              </a:rPr>
-              <a:t> </a:t>
+              <a:t>местоположе</a:t>
+            </a:r>
+            <a:r>
+              <a:rPr lang="bg-BG" sz="1600" dirty="0" smtClean="0">
+                <a:latin typeface="Buxton Sketch" pitchFamily="66" charset="0"/>
+              </a:rPr>
+              <a:t>ни</a:t>
+            </a:r>
+            <a:r>
+              <a:rPr lang="en-US" sz="1600" dirty="0" smtClean="0">
+                <a:latin typeface="Buxton Sketch" pitchFamily="66" charset="0"/>
+              </a:rPr>
+              <a:t>е </a:t>
             </a:r>
             <a:r>
               <a:rPr lang="en-US" sz="1600" dirty="0" err="1" smtClean="0">
@@ -21607,7 +21527,19 @@
               <a:rPr lang="en-US" sz="1600" dirty="0" err="1" smtClean="0">
                 <a:latin typeface="Buxton Sketch" pitchFamily="66" charset="0"/>
               </a:rPr>
-              <a:t>подборяване</a:t>
+              <a:t>под</a:t>
+            </a:r>
+            <a:r>
+              <a:rPr lang="bg-BG" sz="1600" dirty="0" smtClean="0">
+                <a:latin typeface="Buxton Sketch" pitchFamily="66" charset="0"/>
+              </a:rPr>
+              <a:t>о</a:t>
+            </a:r>
+            <a:r>
+              <a:rPr lang="en-US" sz="1600" dirty="0" err="1" smtClean="0">
+                <a:latin typeface="Buxton Sketch" pitchFamily="66" charset="0"/>
+              </a:rPr>
+              <a:t>бряване</a:t>
             </a:r>
             <a:r>
               <a:rPr lang="en-US" sz="1600" dirty="0" smtClean="0">
@@ -21860,6 +21792,13 @@
   <p:clrMapOvr>
     <a:masterClrMapping/>
   </p:clrMapOvr>
+  <p:timing>
+    <p:tnLst>
+      <p:par>
+        <p:cTn id="1" dur="indefinite" restart="never" nodeType="tmRoot"/>
+      </p:par>
+    </p:tnLst>
+  </p:timing>
 </p:sld>
 </file>
 

</xml_diff>